<commit_message>
updated presentation, not finished
</commit_message>
<xml_diff>
--- a/Project 1 Presentation.pptx
+++ b/Project 1 Presentation.pptx
@@ -9,11 +9,19 @@
     <p:sldId id="260" r:id="rId3"/>
     <p:sldId id="262" r:id="rId4"/>
     <p:sldId id="261" r:id="rId5"/>
-    <p:sldId id="257" r:id="rId6"/>
-    <p:sldId id="258" r:id="rId7"/>
-    <p:sldId id="259" r:id="rId8"/>
-    <p:sldId id="263" r:id="rId9"/>
-    <p:sldId id="264" r:id="rId10"/>
+    <p:sldId id="266" r:id="rId6"/>
+    <p:sldId id="257" r:id="rId7"/>
+    <p:sldId id="258" r:id="rId8"/>
+    <p:sldId id="259" r:id="rId9"/>
+    <p:sldId id="267" r:id="rId10"/>
+    <p:sldId id="268" r:id="rId11"/>
+    <p:sldId id="269" r:id="rId12"/>
+    <p:sldId id="272" r:id="rId13"/>
+    <p:sldId id="271" r:id="rId14"/>
+    <p:sldId id="270" r:id="rId15"/>
+    <p:sldId id="263" r:id="rId16"/>
+    <p:sldId id="265" r:id="rId17"/>
+    <p:sldId id="264" r:id="rId18"/>
   </p:sldIdLst>
   <p:sldSz cx="12192000" cy="6858000"/>
   <p:notesSz cx="6858000" cy="9144000"/>
@@ -112,6 +120,11 @@
       </a:defRPr>
     </a:lvl9pPr>
   </p:defaultTextStyle>
+  <p:extLst>
+    <p:ext uri="{EFAFB233-063F-42B5-8137-9DF3F51BA10A}">
+      <p15:sldGuideLst xmlns:p15="http://schemas.microsoft.com/office/powerpoint/2012/main"/>
+    </p:ext>
+  </p:extLst>
 </p:presentation>
 </file>
 
@@ -262,7 +275,7 @@
           <a:p>
             <a:fld id="{7F3A2633-CE2D-4284-AED7-B04551D23CDA}" type="datetimeFigureOut">
               <a:rPr lang="en-US" smtClean="0"/>
-              <a:t>12/1/2019</a:t>
+              <a:t>12/2/2019</a:t>
             </a:fld>
             <a:endParaRPr lang="en-US"/>
           </a:p>
@@ -460,7 +473,7 @@
           <a:p>
             <a:fld id="{7F3A2633-CE2D-4284-AED7-B04551D23CDA}" type="datetimeFigureOut">
               <a:rPr lang="en-US" smtClean="0"/>
-              <a:t>12/1/2019</a:t>
+              <a:t>12/2/2019</a:t>
             </a:fld>
             <a:endParaRPr lang="en-US"/>
           </a:p>
@@ -668,7 +681,7 @@
           <a:p>
             <a:fld id="{7F3A2633-CE2D-4284-AED7-B04551D23CDA}" type="datetimeFigureOut">
               <a:rPr lang="en-US" smtClean="0"/>
-              <a:t>12/1/2019</a:t>
+              <a:t>12/2/2019</a:t>
             </a:fld>
             <a:endParaRPr lang="en-US"/>
           </a:p>
@@ -866,7 +879,7 @@
           <a:p>
             <a:fld id="{7F3A2633-CE2D-4284-AED7-B04551D23CDA}" type="datetimeFigureOut">
               <a:rPr lang="en-US" smtClean="0"/>
-              <a:t>12/1/2019</a:t>
+              <a:t>12/2/2019</a:t>
             </a:fld>
             <a:endParaRPr lang="en-US"/>
           </a:p>
@@ -1141,7 +1154,7 @@
           <a:p>
             <a:fld id="{7F3A2633-CE2D-4284-AED7-B04551D23CDA}" type="datetimeFigureOut">
               <a:rPr lang="en-US" smtClean="0"/>
-              <a:t>12/1/2019</a:t>
+              <a:t>12/2/2019</a:t>
             </a:fld>
             <a:endParaRPr lang="en-US"/>
           </a:p>
@@ -1406,7 +1419,7 @@
           <a:p>
             <a:fld id="{7F3A2633-CE2D-4284-AED7-B04551D23CDA}" type="datetimeFigureOut">
               <a:rPr lang="en-US" smtClean="0"/>
-              <a:t>12/1/2019</a:t>
+              <a:t>12/2/2019</a:t>
             </a:fld>
             <a:endParaRPr lang="en-US"/>
           </a:p>
@@ -1818,7 +1831,7 @@
           <a:p>
             <a:fld id="{7F3A2633-CE2D-4284-AED7-B04551D23CDA}" type="datetimeFigureOut">
               <a:rPr lang="en-US" smtClean="0"/>
-              <a:t>12/1/2019</a:t>
+              <a:t>12/2/2019</a:t>
             </a:fld>
             <a:endParaRPr lang="en-US"/>
           </a:p>
@@ -1959,7 +1972,7 @@
           <a:p>
             <a:fld id="{7F3A2633-CE2D-4284-AED7-B04551D23CDA}" type="datetimeFigureOut">
               <a:rPr lang="en-US" smtClean="0"/>
-              <a:t>12/1/2019</a:t>
+              <a:t>12/2/2019</a:t>
             </a:fld>
             <a:endParaRPr lang="en-US"/>
           </a:p>
@@ -2072,7 +2085,7 @@
           <a:p>
             <a:fld id="{7F3A2633-CE2D-4284-AED7-B04551D23CDA}" type="datetimeFigureOut">
               <a:rPr lang="en-US" smtClean="0"/>
-              <a:t>12/1/2019</a:t>
+              <a:t>12/2/2019</a:t>
             </a:fld>
             <a:endParaRPr lang="en-US"/>
           </a:p>
@@ -2383,7 +2396,7 @@
           <a:p>
             <a:fld id="{7F3A2633-CE2D-4284-AED7-B04551D23CDA}" type="datetimeFigureOut">
               <a:rPr lang="en-US" smtClean="0"/>
-              <a:t>12/1/2019</a:t>
+              <a:t>12/2/2019</a:t>
             </a:fld>
             <a:endParaRPr lang="en-US"/>
           </a:p>
@@ -2671,7 +2684,7 @@
           <a:p>
             <a:fld id="{7F3A2633-CE2D-4284-AED7-B04551D23CDA}" type="datetimeFigureOut">
               <a:rPr lang="en-US" smtClean="0"/>
-              <a:t>12/1/2019</a:t>
+              <a:t>12/2/2019</a:t>
             </a:fld>
             <a:endParaRPr lang="en-US"/>
           </a:p>
@@ -2912,7 +2925,7 @@
           <a:p>
             <a:fld id="{7F3A2633-CE2D-4284-AED7-B04551D23CDA}" type="datetimeFigureOut">
               <a:rPr lang="en-US" smtClean="0"/>
-              <a:t>12/1/2019</a:t>
+              <a:t>12/2/2019</a:t>
             </a:fld>
             <a:endParaRPr lang="en-US"/>
           </a:p>
@@ -3436,7 +3449,7 @@
           <a:p>
             <a:r>
               <a:rPr lang="en-US" dirty="0"/>
-              <a:t>Presenters: Amanda, Dante, Ped &amp; Richard</a:t>
+              <a:t>The Talent: Amanda, Dante, Ped &amp; Richard</a:t>
             </a:r>
           </a:p>
         </p:txBody>
@@ -3445,6 +3458,950 @@
     <p:extLst>
       <p:ext uri="{BB962C8B-B14F-4D97-AF65-F5344CB8AC3E}">
         <p14:creationId xmlns:p14="http://schemas.microsoft.com/office/powerpoint/2010/main" val="2909297798"/>
+      </p:ext>
+    </p:extLst>
+  </p:cSld>
+  <p:clrMapOvr>
+    <a:masterClrMapping/>
+  </p:clrMapOvr>
+</p:sld>
+</file>
+
+<file path=ppt/slides/slide10.xml><?xml version="1.0" encoding="utf-8"?>
+<p:sld xmlns:a="http://schemas.openxmlformats.org/drawingml/2006/main" xmlns:r="http://schemas.openxmlformats.org/officeDocument/2006/relationships" xmlns:p="http://schemas.openxmlformats.org/presentationml/2006/main">
+  <p:cSld>
+    <p:bg>
+      <p:bgPr>
+        <a:blipFill dpi="0" rotWithShape="1">
+          <a:blip r:embed="rId2">
+            <a:lum/>
+          </a:blip>
+          <a:srcRect/>
+          <a:stretch>
+            <a:fillRect t="-18000" b="-18000"/>
+          </a:stretch>
+        </a:blipFill>
+        <a:effectLst/>
+      </p:bgPr>
+    </p:bg>
+    <p:spTree>
+      <p:nvGrpSpPr>
+        <p:cNvPr id="1" name=""/>
+        <p:cNvGrpSpPr/>
+        <p:nvPr/>
+      </p:nvGrpSpPr>
+      <p:grpSpPr>
+        <a:xfrm>
+          <a:off x="0" y="0"/>
+          <a:ext cx="0" cy="0"/>
+          <a:chOff x="0" y="0"/>
+          <a:chExt cx="0" cy="0"/>
+        </a:xfrm>
+      </p:grpSpPr>
+      <p:sp>
+        <p:nvSpPr>
+          <p:cNvPr id="2" name="Title 1">
+            <a:extLst>
+              <a:ext uri="{FF2B5EF4-FFF2-40B4-BE49-F238E27FC236}">
+                <a16:creationId xmlns:a16="http://schemas.microsoft.com/office/drawing/2014/main" id="{70C0E02B-FFF2-43A6-87EA-1B42AF909304}"/>
+              </a:ext>
+            </a:extLst>
+          </p:cNvPr>
+          <p:cNvSpPr>
+            <a:spLocks noGrp="1"/>
+          </p:cNvSpPr>
+          <p:nvPr>
+            <p:ph type="title"/>
+          </p:nvPr>
+        </p:nvSpPr>
+        <p:spPr/>
+        <p:txBody>
+          <a:bodyPr>
+            <a:normAutofit fontScale="90000"/>
+          </a:bodyPr>
+          <a:lstStyle/>
+          <a:p>
+            <a:pPr algn="ctr"/>
+            <a:br>
+              <a:rPr lang="en-US" dirty="0"/>
+            </a:br>
+            <a:br>
+              <a:rPr lang="en-US" dirty="0"/>
+            </a:br>
+            <a:br>
+              <a:rPr lang="en-US" dirty="0"/>
+            </a:br>
+            <a:br>
+              <a:rPr lang="en-US" dirty="0"/>
+            </a:br>
+            <a:br>
+              <a:rPr lang="en-US" dirty="0"/>
+            </a:br>
+            <a:br>
+              <a:rPr lang="en-US" dirty="0"/>
+            </a:br>
+            <a:br>
+              <a:rPr lang="en-US" dirty="0"/>
+            </a:br>
+            <a:br>
+              <a:rPr lang="en-US" dirty="0"/>
+            </a:br>
+            <a:br>
+              <a:rPr lang="en-US" dirty="0"/>
+            </a:br>
+            <a:r>
+              <a:rPr lang="en-US" dirty="0">
+                <a:latin typeface="Arial Black" panose="020B0A04020102020204" pitchFamily="34" charset="0"/>
+              </a:rPr>
+              <a:t>ACT 3:</a:t>
+            </a:r>
+            <a:br>
+              <a:rPr lang="en-US" dirty="0">
+                <a:latin typeface="Arial Black" panose="020B0A04020102020204" pitchFamily="34" charset="0"/>
+              </a:rPr>
+            </a:br>
+            <a:br>
+              <a:rPr lang="en-US" dirty="0">
+                <a:latin typeface="Arial Black" panose="020B0A04020102020204" pitchFamily="34" charset="0"/>
+              </a:rPr>
+            </a:br>
+            <a:r>
+              <a:rPr lang="en-US" sz="6100" b="1" dirty="0">
+                <a:latin typeface="Arial Black" panose="020B0A04020102020204" pitchFamily="34" charset="0"/>
+              </a:rPr>
+              <a:t>Critic vs Audience </a:t>
+            </a:r>
+            <a:br>
+              <a:rPr lang="en-US" sz="6100" b="1" dirty="0">
+                <a:latin typeface="Arial Black" panose="020B0A04020102020204" pitchFamily="34" charset="0"/>
+              </a:rPr>
+            </a:br>
+            <a:r>
+              <a:rPr lang="en-US" sz="6100" b="1" dirty="0">
+                <a:latin typeface="Arial Black" panose="020B0A04020102020204" pitchFamily="34" charset="0"/>
+              </a:rPr>
+              <a:t>Rating</a:t>
+            </a:r>
+            <a:br>
+              <a:rPr lang="en-US" sz="6100" b="1" dirty="0">
+                <a:latin typeface="Arial Black" panose="020B0A04020102020204" pitchFamily="34" charset="0"/>
+              </a:rPr>
+            </a:br>
+            <a:r>
+              <a:rPr lang="en-US" sz="6100" b="1" dirty="0">
+                <a:latin typeface="Arial Black" panose="020B0A04020102020204" pitchFamily="34" charset="0"/>
+              </a:rPr>
+              <a:t>Analysis</a:t>
+            </a:r>
+            <a:endParaRPr lang="en-US" sz="6100" b="1" dirty="0">
+              <a:solidFill>
+                <a:schemeClr val="bg1"/>
+              </a:solidFill>
+              <a:latin typeface="Arial Black" panose="020B0A04020102020204" pitchFamily="34" charset="0"/>
+            </a:endParaRPr>
+          </a:p>
+        </p:txBody>
+      </p:sp>
+    </p:spTree>
+    <p:extLst>
+      <p:ext uri="{BB962C8B-B14F-4D97-AF65-F5344CB8AC3E}">
+        <p14:creationId xmlns:p14="http://schemas.microsoft.com/office/powerpoint/2010/main" val="2572608704"/>
+      </p:ext>
+    </p:extLst>
+  </p:cSld>
+  <p:clrMapOvr>
+    <a:masterClrMapping/>
+  </p:clrMapOvr>
+</p:sld>
+</file>
+
+<file path=ppt/slides/slide11.xml><?xml version="1.0" encoding="utf-8"?>
+<p:sld xmlns:a="http://schemas.openxmlformats.org/drawingml/2006/main" xmlns:r="http://schemas.openxmlformats.org/officeDocument/2006/relationships" xmlns:p="http://schemas.openxmlformats.org/presentationml/2006/main">
+  <p:cSld>
+    <p:bg>
+      <p:bgPr>
+        <a:blipFill dpi="0" rotWithShape="1">
+          <a:blip r:embed="rId2">
+            <a:lum/>
+          </a:blip>
+          <a:srcRect/>
+          <a:stretch>
+            <a:fillRect t="-18000" b="-18000"/>
+          </a:stretch>
+        </a:blipFill>
+        <a:effectLst/>
+      </p:bgPr>
+    </p:bg>
+    <p:spTree>
+      <p:nvGrpSpPr>
+        <p:cNvPr id="1" name=""/>
+        <p:cNvGrpSpPr/>
+        <p:nvPr/>
+      </p:nvGrpSpPr>
+      <p:grpSpPr>
+        <a:xfrm>
+          <a:off x="0" y="0"/>
+          <a:ext cx="0" cy="0"/>
+          <a:chOff x="0" y="0"/>
+          <a:chExt cx="0" cy="0"/>
+        </a:xfrm>
+      </p:grpSpPr>
+      <p:sp>
+        <p:nvSpPr>
+          <p:cNvPr id="2" name="Title 1">
+            <a:extLst>
+              <a:ext uri="{FF2B5EF4-FFF2-40B4-BE49-F238E27FC236}">
+                <a16:creationId xmlns:a16="http://schemas.microsoft.com/office/drawing/2014/main" id="{70C0E02B-FFF2-43A6-87EA-1B42AF909304}"/>
+              </a:ext>
+            </a:extLst>
+          </p:cNvPr>
+          <p:cNvSpPr>
+            <a:spLocks noGrp="1"/>
+          </p:cNvSpPr>
+          <p:nvPr>
+            <p:ph type="title"/>
+          </p:nvPr>
+        </p:nvSpPr>
+        <p:spPr/>
+        <p:txBody>
+          <a:bodyPr>
+            <a:normAutofit fontScale="90000"/>
+          </a:bodyPr>
+          <a:lstStyle/>
+          <a:p>
+            <a:pPr algn="ctr"/>
+            <a:br>
+              <a:rPr lang="en-US" dirty="0"/>
+            </a:br>
+            <a:br>
+              <a:rPr lang="en-US" dirty="0"/>
+            </a:br>
+            <a:br>
+              <a:rPr lang="en-US" dirty="0"/>
+            </a:br>
+            <a:br>
+              <a:rPr lang="en-US" dirty="0"/>
+            </a:br>
+            <a:br>
+              <a:rPr lang="en-US" dirty="0"/>
+            </a:br>
+            <a:br>
+              <a:rPr lang="en-US" dirty="0"/>
+            </a:br>
+            <a:br>
+              <a:rPr lang="en-US" dirty="0"/>
+            </a:br>
+            <a:br>
+              <a:rPr lang="en-US" dirty="0"/>
+            </a:br>
+            <a:br>
+              <a:rPr lang="en-US" dirty="0"/>
+            </a:br>
+            <a:r>
+              <a:rPr lang="en-US" dirty="0">
+                <a:latin typeface="Arial Black" panose="020B0A04020102020204" pitchFamily="34" charset="0"/>
+              </a:rPr>
+              <a:t>ACT 4:</a:t>
+            </a:r>
+            <a:br>
+              <a:rPr lang="en-US" sz="8000" dirty="0">
+                <a:latin typeface="Arial Black" panose="020B0A04020102020204" pitchFamily="34" charset="0"/>
+              </a:rPr>
+            </a:br>
+            <a:br>
+              <a:rPr lang="en-US" sz="6100" dirty="0"/>
+            </a:br>
+            <a:r>
+              <a:rPr lang="en-US" sz="6100" b="1" dirty="0">
+                <a:latin typeface="Arial Black" panose="020B0A04020102020204" pitchFamily="34" charset="0"/>
+              </a:rPr>
+              <a:t>Runtime</a:t>
+            </a:r>
+            <a:br>
+              <a:rPr lang="en-US" sz="6100" b="1" dirty="0">
+                <a:latin typeface="Arial Black" panose="020B0A04020102020204" pitchFamily="34" charset="0"/>
+              </a:rPr>
+            </a:br>
+            <a:r>
+              <a:rPr lang="en-US" sz="6100" b="1" dirty="0">
+                <a:latin typeface="Arial Black" panose="020B0A04020102020204" pitchFamily="34" charset="0"/>
+              </a:rPr>
+              <a:t>Analysis</a:t>
+            </a:r>
+            <a:endParaRPr lang="en-US" sz="6100" b="1" dirty="0">
+              <a:solidFill>
+                <a:schemeClr val="bg1"/>
+              </a:solidFill>
+              <a:latin typeface="Arial Black" panose="020B0A04020102020204" pitchFamily="34" charset="0"/>
+            </a:endParaRPr>
+          </a:p>
+        </p:txBody>
+      </p:sp>
+    </p:spTree>
+    <p:extLst>
+      <p:ext uri="{BB962C8B-B14F-4D97-AF65-F5344CB8AC3E}">
+        <p14:creationId xmlns:p14="http://schemas.microsoft.com/office/powerpoint/2010/main" val="191506673"/>
+      </p:ext>
+    </p:extLst>
+  </p:cSld>
+  <p:clrMapOvr>
+    <a:masterClrMapping/>
+  </p:clrMapOvr>
+</p:sld>
+</file>
+
+<file path=ppt/slides/slide12.xml><?xml version="1.0" encoding="utf-8"?>
+<p:sld xmlns:a="http://schemas.openxmlformats.org/drawingml/2006/main" xmlns:r="http://schemas.openxmlformats.org/officeDocument/2006/relationships" xmlns:p="http://schemas.openxmlformats.org/presentationml/2006/main">
+  <p:cSld>
+    <p:spTree>
+      <p:nvGrpSpPr>
+        <p:cNvPr id="1" name=""/>
+        <p:cNvGrpSpPr/>
+        <p:nvPr/>
+      </p:nvGrpSpPr>
+      <p:grpSpPr>
+        <a:xfrm>
+          <a:off x="0" y="0"/>
+          <a:ext cx="0" cy="0"/>
+          <a:chOff x="0" y="0"/>
+          <a:chExt cx="0" cy="0"/>
+        </a:xfrm>
+      </p:grpSpPr>
+      <p:sp>
+        <p:nvSpPr>
+          <p:cNvPr id="2" name="Title 1">
+            <a:extLst>
+              <a:ext uri="{FF2B5EF4-FFF2-40B4-BE49-F238E27FC236}">
+                <a16:creationId xmlns:a16="http://schemas.microsoft.com/office/drawing/2014/main" id="{8C564F25-5CD6-4C28-9934-78FFF7F9C221}"/>
+              </a:ext>
+            </a:extLst>
+          </p:cNvPr>
+          <p:cNvSpPr>
+            <a:spLocks noGrp="1"/>
+          </p:cNvSpPr>
+          <p:nvPr>
+            <p:ph type="title"/>
+          </p:nvPr>
+        </p:nvSpPr>
+        <p:spPr/>
+        <p:txBody>
+          <a:bodyPr/>
+          <a:lstStyle/>
+          <a:p>
+            <a:r>
+              <a:rPr lang="en-US" dirty="0"/>
+              <a:t>ROI  vs Runtime</a:t>
+            </a:r>
+          </a:p>
+        </p:txBody>
+      </p:sp>
+      <p:pic>
+        <p:nvPicPr>
+          <p:cNvPr id="5" name="Content Placeholder 4" descr="A screenshot of a cell phone&#10;&#10;Description automatically generated">
+            <a:extLst>
+              <a:ext uri="{FF2B5EF4-FFF2-40B4-BE49-F238E27FC236}">
+                <a16:creationId xmlns:a16="http://schemas.microsoft.com/office/drawing/2014/main" id="{CF85D5CA-F276-435F-BDBA-4325BC33264E}"/>
+              </a:ext>
+            </a:extLst>
+          </p:cNvPr>
+          <p:cNvPicPr>
+            <a:picLocks noGrp="1" noChangeAspect="1"/>
+          </p:cNvPicPr>
+          <p:nvPr>
+            <p:ph idx="1"/>
+          </p:nvPr>
+        </p:nvPicPr>
+        <p:blipFill>
+          <a:blip r:embed="rId2">
+            <a:extLst>
+              <a:ext uri="{28A0092B-C50C-407E-A947-70E740481C1C}">
+                <a14:useLocalDpi xmlns:a14="http://schemas.microsoft.com/office/drawing/2010/main" val="0"/>
+              </a:ext>
+            </a:extLst>
+          </a:blip>
+          <a:stretch>
+            <a:fillRect/>
+          </a:stretch>
+        </p:blipFill>
+        <p:spPr>
+          <a:xfrm>
+            <a:off x="4659366" y="-191794"/>
+            <a:ext cx="7433469" cy="7433469"/>
+          </a:xfrm>
+        </p:spPr>
+      </p:pic>
+    </p:spTree>
+    <p:extLst>
+      <p:ext uri="{BB962C8B-B14F-4D97-AF65-F5344CB8AC3E}">
+        <p14:creationId xmlns:p14="http://schemas.microsoft.com/office/powerpoint/2010/main" val="1709583000"/>
+      </p:ext>
+    </p:extLst>
+  </p:cSld>
+  <p:clrMapOvr>
+    <a:masterClrMapping/>
+  </p:clrMapOvr>
+</p:sld>
+</file>
+
+<file path=ppt/slides/slide13.xml><?xml version="1.0" encoding="utf-8"?>
+<p:sld xmlns:a="http://schemas.openxmlformats.org/drawingml/2006/main" xmlns:r="http://schemas.openxmlformats.org/officeDocument/2006/relationships" xmlns:p="http://schemas.openxmlformats.org/presentationml/2006/main">
+  <p:cSld>
+    <p:spTree>
+      <p:nvGrpSpPr>
+        <p:cNvPr id="1" name=""/>
+        <p:cNvGrpSpPr/>
+        <p:nvPr/>
+      </p:nvGrpSpPr>
+      <p:grpSpPr>
+        <a:xfrm>
+          <a:off x="0" y="0"/>
+          <a:ext cx="0" cy="0"/>
+          <a:chOff x="0" y="0"/>
+          <a:chExt cx="0" cy="0"/>
+        </a:xfrm>
+      </p:grpSpPr>
+      <p:sp>
+        <p:nvSpPr>
+          <p:cNvPr id="2" name="Title 1">
+            <a:extLst>
+              <a:ext uri="{FF2B5EF4-FFF2-40B4-BE49-F238E27FC236}">
+                <a16:creationId xmlns:a16="http://schemas.microsoft.com/office/drawing/2014/main" id="{C6F44AEF-9892-4647-B960-A9C029F74B59}"/>
+              </a:ext>
+            </a:extLst>
+          </p:cNvPr>
+          <p:cNvSpPr>
+            <a:spLocks noGrp="1"/>
+          </p:cNvSpPr>
+          <p:nvPr>
+            <p:ph type="title"/>
+          </p:nvPr>
+        </p:nvSpPr>
+        <p:spPr/>
+        <p:txBody>
+          <a:bodyPr/>
+          <a:lstStyle/>
+          <a:p>
+            <a:r>
+              <a:rPr lang="en-US" dirty="0"/>
+              <a:t>Budget vs Runtime</a:t>
+            </a:r>
+          </a:p>
+        </p:txBody>
+      </p:sp>
+      <p:pic>
+        <p:nvPicPr>
+          <p:cNvPr id="4" name="Picture 3" descr="A picture containing text, drawing&#10;&#10;Description automatically generated">
+            <a:extLst>
+              <a:ext uri="{FF2B5EF4-FFF2-40B4-BE49-F238E27FC236}">
+                <a16:creationId xmlns:a16="http://schemas.microsoft.com/office/drawing/2014/main" id="{18614CAF-2220-4F7D-B5E4-8390394097F2}"/>
+              </a:ext>
+            </a:extLst>
+          </p:cNvPr>
+          <p:cNvPicPr>
+            <a:picLocks noChangeAspect="1"/>
+          </p:cNvPicPr>
+          <p:nvPr/>
+        </p:nvPicPr>
+        <p:blipFill>
+          <a:blip r:embed="rId2">
+            <a:extLst>
+              <a:ext uri="{28A0092B-C50C-407E-A947-70E740481C1C}">
+                <a14:useLocalDpi xmlns:a14="http://schemas.microsoft.com/office/drawing/2010/main" val="0"/>
+              </a:ext>
+            </a:extLst>
+          </a:blip>
+          <a:stretch>
+            <a:fillRect/>
+          </a:stretch>
+        </p:blipFill>
+        <p:spPr>
+          <a:xfrm>
+            <a:off x="5129016" y="-102080"/>
+            <a:ext cx="7467383" cy="7467383"/>
+          </a:xfrm>
+          <a:prstGeom prst="rect">
+            <a:avLst/>
+          </a:prstGeom>
+        </p:spPr>
+      </p:pic>
+    </p:spTree>
+    <p:extLst>
+      <p:ext uri="{BB962C8B-B14F-4D97-AF65-F5344CB8AC3E}">
+        <p14:creationId xmlns:p14="http://schemas.microsoft.com/office/powerpoint/2010/main" val="3304017016"/>
+      </p:ext>
+    </p:extLst>
+  </p:cSld>
+  <p:clrMapOvr>
+    <a:masterClrMapping/>
+  </p:clrMapOvr>
+</p:sld>
+</file>
+
+<file path=ppt/slides/slide14.xml><?xml version="1.0" encoding="utf-8"?>
+<p:sld xmlns:a="http://schemas.openxmlformats.org/drawingml/2006/main" xmlns:r="http://schemas.openxmlformats.org/officeDocument/2006/relationships" xmlns:p="http://schemas.openxmlformats.org/presentationml/2006/main">
+  <p:cSld>
+    <p:bg>
+      <p:bgPr>
+        <a:blipFill dpi="0" rotWithShape="1">
+          <a:blip r:embed="rId2">
+            <a:lum/>
+          </a:blip>
+          <a:srcRect/>
+          <a:stretch>
+            <a:fillRect t="-18000" b="-18000"/>
+          </a:stretch>
+        </a:blipFill>
+        <a:effectLst/>
+      </p:bgPr>
+    </p:bg>
+    <p:spTree>
+      <p:nvGrpSpPr>
+        <p:cNvPr id="1" name=""/>
+        <p:cNvGrpSpPr/>
+        <p:nvPr/>
+      </p:nvGrpSpPr>
+      <p:grpSpPr>
+        <a:xfrm>
+          <a:off x="0" y="0"/>
+          <a:ext cx="0" cy="0"/>
+          <a:chOff x="0" y="0"/>
+          <a:chExt cx="0" cy="0"/>
+        </a:xfrm>
+      </p:grpSpPr>
+      <p:sp>
+        <p:nvSpPr>
+          <p:cNvPr id="2" name="Title 1">
+            <a:extLst>
+              <a:ext uri="{FF2B5EF4-FFF2-40B4-BE49-F238E27FC236}">
+                <a16:creationId xmlns:a16="http://schemas.microsoft.com/office/drawing/2014/main" id="{70C0E02B-FFF2-43A6-87EA-1B42AF909304}"/>
+              </a:ext>
+            </a:extLst>
+          </p:cNvPr>
+          <p:cNvSpPr>
+            <a:spLocks noGrp="1"/>
+          </p:cNvSpPr>
+          <p:nvPr>
+            <p:ph type="title"/>
+          </p:nvPr>
+        </p:nvSpPr>
+        <p:spPr/>
+        <p:txBody>
+          <a:bodyPr>
+            <a:normAutofit fontScale="90000"/>
+          </a:bodyPr>
+          <a:lstStyle/>
+          <a:p>
+            <a:pPr algn="ctr"/>
+            <a:br>
+              <a:rPr lang="en-US" dirty="0"/>
+            </a:br>
+            <a:br>
+              <a:rPr lang="en-US" dirty="0"/>
+            </a:br>
+            <a:br>
+              <a:rPr lang="en-US" dirty="0"/>
+            </a:br>
+            <a:br>
+              <a:rPr lang="en-US" dirty="0"/>
+            </a:br>
+            <a:br>
+              <a:rPr lang="en-US" dirty="0"/>
+            </a:br>
+            <a:br>
+              <a:rPr lang="en-US" dirty="0"/>
+            </a:br>
+            <a:br>
+              <a:rPr lang="en-US" dirty="0"/>
+            </a:br>
+            <a:br>
+              <a:rPr lang="en-US" dirty="0"/>
+            </a:br>
+            <a:br>
+              <a:rPr lang="en-US" dirty="0"/>
+            </a:br>
+            <a:r>
+              <a:rPr lang="en-US" sz="6100" b="1" dirty="0">
+                <a:latin typeface="Arial Black" panose="020B0A04020102020204" pitchFamily="34" charset="0"/>
+              </a:rPr>
+              <a:t>Overall</a:t>
+            </a:r>
+            <a:br>
+              <a:rPr lang="en-US" sz="6100" b="1" dirty="0">
+                <a:latin typeface="Arial Black" panose="020B0A04020102020204" pitchFamily="34" charset="0"/>
+              </a:rPr>
+            </a:br>
+            <a:r>
+              <a:rPr lang="en-US" sz="6100" b="1" dirty="0">
+                <a:latin typeface="Arial Black" panose="020B0A04020102020204" pitchFamily="34" charset="0"/>
+              </a:rPr>
+              <a:t>Analysis</a:t>
+            </a:r>
+          </a:p>
+        </p:txBody>
+      </p:sp>
+    </p:spTree>
+    <p:extLst>
+      <p:ext uri="{BB962C8B-B14F-4D97-AF65-F5344CB8AC3E}">
+        <p14:creationId xmlns:p14="http://schemas.microsoft.com/office/powerpoint/2010/main" val="625470805"/>
+      </p:ext>
+    </p:extLst>
+  </p:cSld>
+  <p:clrMapOvr>
+    <a:masterClrMapping/>
+  </p:clrMapOvr>
+</p:sld>
+</file>
+
+<file path=ppt/slides/slide15.xml><?xml version="1.0" encoding="utf-8"?>
+<p:sld xmlns:a="http://schemas.openxmlformats.org/drawingml/2006/main" xmlns:r="http://schemas.openxmlformats.org/officeDocument/2006/relationships" xmlns:p="http://schemas.openxmlformats.org/presentationml/2006/main">
+  <p:cSld>
+    <p:bg>
+      <p:bgPr>
+        <a:blipFill dpi="0" rotWithShape="1">
+          <a:blip r:embed="rId2">
+            <a:lum/>
+          </a:blip>
+          <a:srcRect/>
+          <a:stretch>
+            <a:fillRect t="-7000" b="-7000"/>
+          </a:stretch>
+        </a:blipFill>
+        <a:effectLst/>
+      </p:bgPr>
+    </p:bg>
+    <p:spTree>
+      <p:nvGrpSpPr>
+        <p:cNvPr id="1" name=""/>
+        <p:cNvGrpSpPr/>
+        <p:nvPr/>
+      </p:nvGrpSpPr>
+      <p:grpSpPr>
+        <a:xfrm>
+          <a:off x="0" y="0"/>
+          <a:ext cx="0" cy="0"/>
+          <a:chOff x="0" y="0"/>
+          <a:chExt cx="0" cy="0"/>
+        </a:xfrm>
+      </p:grpSpPr>
+      <p:sp>
+        <p:nvSpPr>
+          <p:cNvPr id="2" name="Title 1">
+            <a:extLst>
+              <a:ext uri="{FF2B5EF4-FFF2-40B4-BE49-F238E27FC236}">
+                <a16:creationId xmlns:a16="http://schemas.microsoft.com/office/drawing/2014/main" id="{560864A3-98A1-4552-8A4F-02D846262E9C}"/>
+              </a:ext>
+            </a:extLst>
+          </p:cNvPr>
+          <p:cNvSpPr>
+            <a:spLocks noGrp="1"/>
+          </p:cNvSpPr>
+          <p:nvPr>
+            <p:ph type="title"/>
+          </p:nvPr>
+        </p:nvSpPr>
+        <p:spPr/>
+        <p:txBody>
+          <a:bodyPr/>
+          <a:lstStyle/>
+          <a:p>
+            <a:pPr algn="ctr"/>
+            <a:br>
+              <a:rPr lang="en-US" b="1" dirty="0"/>
+            </a:br>
+            <a:r>
+              <a:rPr lang="en-US" b="1" dirty="0"/>
+              <a:t>Complete Conclusion</a:t>
+            </a:r>
+          </a:p>
+        </p:txBody>
+      </p:sp>
+      <p:sp>
+        <p:nvSpPr>
+          <p:cNvPr id="3" name="Content Placeholder 2">
+            <a:extLst>
+              <a:ext uri="{FF2B5EF4-FFF2-40B4-BE49-F238E27FC236}">
+                <a16:creationId xmlns:a16="http://schemas.microsoft.com/office/drawing/2014/main" id="{854828F9-E88B-487D-972A-58EA7768DD62}"/>
+              </a:ext>
+            </a:extLst>
+          </p:cNvPr>
+          <p:cNvSpPr>
+            <a:spLocks noGrp="1"/>
+          </p:cNvSpPr>
+          <p:nvPr>
+            <p:ph idx="1"/>
+          </p:nvPr>
+        </p:nvSpPr>
+        <p:spPr/>
+        <p:txBody>
+          <a:bodyPr/>
+          <a:lstStyle/>
+          <a:p>
+            <a:r>
+              <a:rPr lang="en-US" dirty="0"/>
+              <a:t>Point 1</a:t>
+            </a:r>
+          </a:p>
+          <a:p>
+            <a:r>
+              <a:rPr lang="en-US" dirty="0"/>
+              <a:t>Point 2</a:t>
+            </a:r>
+          </a:p>
+          <a:p>
+            <a:r>
+              <a:rPr lang="en-US" dirty="0"/>
+              <a:t>Point 3</a:t>
+            </a:r>
+          </a:p>
+        </p:txBody>
+      </p:sp>
+    </p:spTree>
+    <p:extLst>
+      <p:ext uri="{BB962C8B-B14F-4D97-AF65-F5344CB8AC3E}">
+        <p14:creationId xmlns:p14="http://schemas.microsoft.com/office/powerpoint/2010/main" val="217226028"/>
+      </p:ext>
+    </p:extLst>
+  </p:cSld>
+  <p:clrMapOvr>
+    <a:masterClrMapping/>
+  </p:clrMapOvr>
+</p:sld>
+</file>
+
+<file path=ppt/slides/slide16.xml><?xml version="1.0" encoding="utf-8"?>
+<p:sld xmlns:a="http://schemas.openxmlformats.org/drawingml/2006/main" xmlns:r="http://schemas.openxmlformats.org/officeDocument/2006/relationships" xmlns:p="http://schemas.openxmlformats.org/presentationml/2006/main">
+  <p:cSld>
+    <p:bg>
+      <p:bgPr>
+        <a:blipFill dpi="0" rotWithShape="1">
+          <a:blip r:embed="rId2">
+            <a:lum/>
+          </a:blip>
+          <a:srcRect/>
+          <a:stretch>
+            <a:fillRect t="-7000" b="-7000"/>
+          </a:stretch>
+        </a:blipFill>
+        <a:effectLst/>
+      </p:bgPr>
+    </p:bg>
+    <p:spTree>
+      <p:nvGrpSpPr>
+        <p:cNvPr id="1" name=""/>
+        <p:cNvGrpSpPr/>
+        <p:nvPr/>
+      </p:nvGrpSpPr>
+      <p:grpSpPr>
+        <a:xfrm>
+          <a:off x="0" y="0"/>
+          <a:ext cx="0" cy="0"/>
+          <a:chOff x="0" y="0"/>
+          <a:chExt cx="0" cy="0"/>
+        </a:xfrm>
+      </p:grpSpPr>
+      <p:sp>
+        <p:nvSpPr>
+          <p:cNvPr id="2" name="Title 1">
+            <a:extLst>
+              <a:ext uri="{FF2B5EF4-FFF2-40B4-BE49-F238E27FC236}">
+                <a16:creationId xmlns:a16="http://schemas.microsoft.com/office/drawing/2014/main" id="{560864A3-98A1-4552-8A4F-02D846262E9C}"/>
+              </a:ext>
+            </a:extLst>
+          </p:cNvPr>
+          <p:cNvSpPr>
+            <a:spLocks noGrp="1"/>
+          </p:cNvSpPr>
+          <p:nvPr>
+            <p:ph type="title"/>
+          </p:nvPr>
+        </p:nvSpPr>
+        <p:spPr/>
+        <p:txBody>
+          <a:bodyPr/>
+          <a:lstStyle/>
+          <a:p>
+            <a:pPr algn="ctr"/>
+            <a:br>
+              <a:rPr lang="en-US" b="1" dirty="0"/>
+            </a:br>
+            <a:r>
+              <a:rPr lang="en-US" b="1" dirty="0"/>
+              <a:t>Post Mortem</a:t>
+            </a:r>
+          </a:p>
+        </p:txBody>
+      </p:sp>
+      <p:sp>
+        <p:nvSpPr>
+          <p:cNvPr id="3" name="Content Placeholder 2">
+            <a:extLst>
+              <a:ext uri="{FF2B5EF4-FFF2-40B4-BE49-F238E27FC236}">
+                <a16:creationId xmlns:a16="http://schemas.microsoft.com/office/drawing/2014/main" id="{854828F9-E88B-487D-972A-58EA7768DD62}"/>
+              </a:ext>
+            </a:extLst>
+          </p:cNvPr>
+          <p:cNvSpPr>
+            <a:spLocks noGrp="1"/>
+          </p:cNvSpPr>
+          <p:nvPr>
+            <p:ph idx="1"/>
+          </p:nvPr>
+        </p:nvSpPr>
+        <p:spPr/>
+        <p:txBody>
+          <a:bodyPr/>
+          <a:lstStyle/>
+          <a:p>
+            <a:r>
+              <a:rPr lang="en-US" dirty="0"/>
+              <a:t>Wanted to include movie awards, but removed due to timing</a:t>
+            </a:r>
+          </a:p>
+          <a:p>
+            <a:r>
+              <a:rPr lang="en-US" dirty="0"/>
+              <a:t>Data source issues, then the API’s didn’t have everything, had timing/count issues</a:t>
+            </a:r>
+          </a:p>
+          <a:p>
+            <a:r>
+              <a:rPr lang="en-US" dirty="0"/>
+              <a:t>Would like to have reviewed in more depth why the movie rating versus the ROI fluctuated year over year?</a:t>
+            </a:r>
+          </a:p>
+          <a:p>
+            <a:pPr lvl="1"/>
+            <a:r>
+              <a:rPr lang="en-US" dirty="0"/>
+              <a:t>Were there other factors influencing the ROI?</a:t>
+            </a:r>
+          </a:p>
+        </p:txBody>
+      </p:sp>
+    </p:spTree>
+    <p:extLst>
+      <p:ext uri="{BB962C8B-B14F-4D97-AF65-F5344CB8AC3E}">
+        <p14:creationId xmlns:p14="http://schemas.microsoft.com/office/powerpoint/2010/main" val="2458269908"/>
+      </p:ext>
+    </p:extLst>
+  </p:cSld>
+  <p:clrMapOvr>
+    <a:masterClrMapping/>
+  </p:clrMapOvr>
+</p:sld>
+</file>
+
+<file path=ppt/slides/slide17.xml><?xml version="1.0" encoding="utf-8"?>
+<p:sld xmlns:a="http://schemas.openxmlformats.org/drawingml/2006/main" xmlns:r="http://schemas.openxmlformats.org/officeDocument/2006/relationships" xmlns:p="http://schemas.openxmlformats.org/presentationml/2006/main">
+  <p:cSld>
+    <p:bg>
+      <p:bgPr>
+        <a:blipFill dpi="0" rotWithShape="1">
+          <a:blip r:embed="rId2">
+            <a:lum/>
+          </a:blip>
+          <a:srcRect/>
+          <a:stretch>
+            <a:fillRect t="-17000" b="-17000"/>
+          </a:stretch>
+        </a:blipFill>
+        <a:effectLst/>
+      </p:bgPr>
+    </p:bg>
+    <p:spTree>
+      <p:nvGrpSpPr>
+        <p:cNvPr id="1" name=""/>
+        <p:cNvGrpSpPr/>
+        <p:nvPr/>
+      </p:nvGrpSpPr>
+      <p:grpSpPr>
+        <a:xfrm>
+          <a:off x="0" y="0"/>
+          <a:ext cx="0" cy="0"/>
+          <a:chOff x="0" y="0"/>
+          <a:chExt cx="0" cy="0"/>
+        </a:xfrm>
+      </p:grpSpPr>
+      <p:sp>
+        <p:nvSpPr>
+          <p:cNvPr id="2" name="Title 1">
+            <a:extLst>
+              <a:ext uri="{FF2B5EF4-FFF2-40B4-BE49-F238E27FC236}">
+                <a16:creationId xmlns:a16="http://schemas.microsoft.com/office/drawing/2014/main" id="{B25748F9-2367-47F9-961C-B8F5427D5420}"/>
+              </a:ext>
+            </a:extLst>
+          </p:cNvPr>
+          <p:cNvSpPr>
+            <a:spLocks noGrp="1"/>
+          </p:cNvSpPr>
+          <p:nvPr>
+            <p:ph type="title"/>
+          </p:nvPr>
+        </p:nvSpPr>
+        <p:spPr/>
+        <p:txBody>
+          <a:bodyPr/>
+          <a:lstStyle/>
+          <a:p>
+            <a:r>
+              <a:rPr lang="en-US" dirty="0"/>
+              <a:t> </a:t>
+            </a:r>
+          </a:p>
+        </p:txBody>
+      </p:sp>
+      <p:sp>
+        <p:nvSpPr>
+          <p:cNvPr id="3" name="Content Placeholder 2">
+            <a:extLst>
+              <a:ext uri="{FF2B5EF4-FFF2-40B4-BE49-F238E27FC236}">
+                <a16:creationId xmlns:a16="http://schemas.microsoft.com/office/drawing/2014/main" id="{A25AC3A2-B41F-4905-99C5-D0F77D215056}"/>
+              </a:ext>
+            </a:extLst>
+          </p:cNvPr>
+          <p:cNvSpPr>
+            <a:spLocks noGrp="1"/>
+          </p:cNvSpPr>
+          <p:nvPr>
+            <p:ph idx="1"/>
+          </p:nvPr>
+        </p:nvSpPr>
+        <p:spPr/>
+        <p:txBody>
+          <a:bodyPr/>
+          <a:lstStyle/>
+          <a:p>
+            <a:r>
+              <a:rPr lang="en-US" dirty="0"/>
+              <a:t>     </a:t>
+            </a:r>
+          </a:p>
+          <a:p>
+            <a:endParaRPr lang="en-US" dirty="0"/>
+          </a:p>
+          <a:p>
+            <a:endParaRPr lang="en-US" dirty="0"/>
+          </a:p>
+          <a:p>
+            <a:pPr marL="0" indent="0" algn="ctr">
+              <a:buNone/>
+            </a:pPr>
+            <a:r>
+              <a:rPr lang="en-US" sz="9600" b="1" dirty="0">
+                <a:solidFill>
+                  <a:schemeClr val="bg1"/>
+                </a:solidFill>
+                <a:latin typeface="Arial Black" panose="020B0A04020102020204" pitchFamily="34" charset="0"/>
+              </a:rPr>
+              <a:t>Q &amp; A</a:t>
+            </a:r>
+          </a:p>
+        </p:txBody>
+      </p:sp>
+    </p:spTree>
+    <p:extLst>
+      <p:ext uri="{BB962C8B-B14F-4D97-AF65-F5344CB8AC3E}">
+        <p14:creationId xmlns:p14="http://schemas.microsoft.com/office/powerpoint/2010/main" val="3698691496"/>
       </p:ext>
     </p:extLst>
   </p:cSld>
@@ -3512,7 +4469,11 @@
             </a:br>
             <a:r>
               <a:rPr lang="en-US" b="1" dirty="0"/>
-              <a:t>The Goal of the Project</a:t>
+              <a:t>The Plot </a:t>
+            </a:r>
+            <a:r>
+              <a:rPr lang="en-US" sz="3600" b="1" dirty="0"/>
+              <a:t>(Motivation)</a:t>
             </a:r>
           </a:p>
         </p:txBody>
@@ -3542,14 +4503,14 @@
           <a:p>
             <a:r>
               <a:rPr lang="en-US" dirty="0"/>
-              <a:t>Can we determine what the best type of movies to make based on a number of factors compared to ROI</a:t>
+              <a:t>Can we determine what the best type of movies to make based on a number of factors compared to ROI?</a:t>
             </a:r>
           </a:p>
           <a:p>
             <a:pPr lvl="1"/>
             <a:r>
               <a:rPr lang="en-US" dirty="0"/>
-              <a:t>Rating</a:t>
+              <a:t>Movie Rating</a:t>
             </a:r>
           </a:p>
           <a:p>
@@ -3563,14 +4524,23 @@
             <a:pPr lvl="1"/>
             <a:r>
               <a:rPr lang="en-US" dirty="0"/>
-              <a:t>Critic Ratings</a:t>
+              <a:t>Critic Ratings vs Audience Ratings</a:t>
             </a:r>
           </a:p>
           <a:p>
             <a:pPr lvl="1"/>
             <a:r>
               <a:rPr lang="en-US" dirty="0"/>
-              <a:t>Audience Ratings</a:t>
+              <a:t>Runtime</a:t>
+            </a:r>
+          </a:p>
+          <a:p>
+            <a:endParaRPr lang="en-US" dirty="0"/>
+          </a:p>
+          <a:p>
+            <a:r>
+              <a:rPr lang="en-US" dirty="0"/>
+              <a:t>Choose since the data was readily available and how most individuals look at movies before seeing them</a:t>
             </a:r>
           </a:p>
           <a:p>
@@ -3656,7 +4626,11 @@
             </a:br>
             <a:r>
               <a:rPr lang="en-US" b="1" dirty="0"/>
-              <a:t>Data Sources</a:t>
+              <a:t>Story Board </a:t>
+            </a:r>
+            <a:r>
+              <a:rPr lang="en-US" sz="3600" b="1" dirty="0"/>
+              <a:t>(Data Sources)</a:t>
             </a:r>
           </a:p>
         </p:txBody>
@@ -3686,19 +4660,48 @@
           <a:p>
             <a:r>
               <a:rPr lang="en-US" dirty="0"/>
-              <a:t>A Rotten Tomatoes CSV file with Movie Name, Ratings, Genres, Year, Runtime, Critic and Audience Ratings</a:t>
-            </a:r>
-          </a:p>
-          <a:p>
-            <a:r>
-              <a:rPr lang="en-US" dirty="0"/>
-              <a:t>The Numbers website that had the movies budget and domestic gross revenue</a:t>
+              <a:t>A Rotten Tomatoes CSV file with Movie Name, Ratings, Genres, Year, Runtime, Critic and Audience Ratings </a:t>
+            </a:r>
+            <a:r>
+              <a:rPr lang="en-US" sz="2400" dirty="0"/>
+              <a:t>– found on Kaggle.com</a:t>
+            </a:r>
+          </a:p>
+          <a:p>
+            <a:r>
+              <a:rPr lang="en-US" dirty="0"/>
+              <a:t>The Numbers website that had the movies budget and domestic gross revenue </a:t>
+            </a:r>
+            <a:r>
+              <a:rPr lang="en-US" sz="2400" dirty="0"/>
+              <a:t>- www.the-numbers.com</a:t>
+            </a:r>
+          </a:p>
+          <a:p>
+            <a:pPr lvl="1"/>
+            <a:r>
+              <a:rPr lang="en-US" dirty="0"/>
+              <a:t>Had to manually screen scrape the data</a:t>
+            </a:r>
+          </a:p>
+          <a:p>
+            <a:pPr lvl="1"/>
+            <a:r>
+              <a:rPr lang="en-US" dirty="0"/>
+              <a:t>Used excel to get only movies with a domestic gross above $10M</a:t>
             </a:r>
           </a:p>
           <a:p>
             <a:r>
               <a:rPr lang="en-US" dirty="0"/>
               <a:t>Took 1999-2018</a:t>
+            </a:r>
+          </a:p>
+          <a:p>
+            <a:pPr lvl="1"/>
+            <a:r>
+              <a:rPr lang="en-US" dirty="0"/>
+              <a:t>Rotten tomatoes didn’t have much for 2019 and wanted a full 20 years</a:t>
             </a:r>
           </a:p>
           <a:p>
@@ -3780,7 +4783,11 @@
             </a:br>
             <a:r>
               <a:rPr lang="en-US" b="1" dirty="0"/>
-              <a:t>Data Cleansing</a:t>
+              <a:t>Cut &amp; Editing </a:t>
+            </a:r>
+            <a:r>
+              <a:rPr lang="en-US" sz="3600" b="1" dirty="0"/>
+              <a:t>(Data Cleansing)</a:t>
             </a:r>
           </a:p>
         </p:txBody>
@@ -3810,7 +4817,29 @@
           <a:p>
             <a:r>
               <a:rPr lang="en-US" dirty="0"/>
-              <a:t>Had to alter movie names to get a match</a:t>
+              <a:t>Merged both CSV’s into a single data frame based on movie title &amp; year</a:t>
+            </a:r>
+          </a:p>
+          <a:p>
+            <a:pPr lvl="1"/>
+            <a:r>
+              <a:rPr lang="en-US" dirty="0"/>
+              <a:t>Had to alter movie names to get a match </a:t>
+            </a:r>
+            <a:r>
+              <a:rPr lang="en-US" dirty="0" err="1"/>
+              <a:t>i.e</a:t>
+            </a:r>
+            <a:r>
+              <a:rPr lang="en-US" dirty="0"/>
+              <a:t> Episode vs Ep.</a:t>
+            </a:r>
+          </a:p>
+          <a:p>
+            <a:pPr lvl="1"/>
+            <a:r>
+              <a:rPr lang="en-US" dirty="0"/>
+              <a:t>Unified column headings</a:t>
             </a:r>
           </a:p>
           <a:p>
@@ -3822,7 +4851,13 @@
           <a:p>
             <a:r>
               <a:rPr lang="en-US" dirty="0"/>
-              <a:t>Removed those that didn’t have a run time or rating</a:t>
+              <a:t>Dropped columns we weren’t using for analysis</a:t>
+            </a:r>
+          </a:p>
+          <a:p>
+            <a:r>
+              <a:rPr lang="en-US" dirty="0"/>
+              <a:t>Removed those that didn’t have a run time or rating, to not skew the averages or counts</a:t>
             </a:r>
           </a:p>
           <a:p>
@@ -3849,6 +4884,20 @@
 <file path=ppt/slides/slide5.xml><?xml version="1.0" encoding="utf-8"?>
 <p:sld xmlns:a="http://schemas.openxmlformats.org/drawingml/2006/main" xmlns:r="http://schemas.openxmlformats.org/officeDocument/2006/relationships" xmlns:p="http://schemas.openxmlformats.org/presentationml/2006/main">
   <p:cSld>
+    <p:bg>
+      <p:bgPr>
+        <a:blipFill dpi="0" rotWithShape="1">
+          <a:blip r:embed="rId2">
+            <a:lum/>
+          </a:blip>
+          <a:srcRect/>
+          <a:stretch>
+            <a:fillRect t="-18000" b="-18000"/>
+          </a:stretch>
+        </a:blipFill>
+        <a:effectLst/>
+      </p:bgPr>
+    </p:bg>
     <p:spTree>
       <p:nvGrpSpPr>
         <p:cNvPr id="1" name=""/>
@@ -3863,47 +4912,12 @@
           <a:chExt cx="0" cy="0"/>
         </a:xfrm>
       </p:grpSpPr>
-      <p:pic>
-        <p:nvPicPr>
-          <p:cNvPr id="8" name="Content Placeholder 7" descr="A close up of a map&#10;&#10;Description automatically generated">
-            <a:extLst>
-              <a:ext uri="{FF2B5EF4-FFF2-40B4-BE49-F238E27FC236}">
-                <a16:creationId xmlns:a16="http://schemas.microsoft.com/office/drawing/2014/main" id="{0B7BE1D6-1C78-453D-8956-83F80D267369}"/>
-              </a:ext>
-            </a:extLst>
-          </p:cNvPr>
-          <p:cNvPicPr>
-            <a:picLocks noGrp="1" noChangeAspect="1"/>
-          </p:cNvPicPr>
-          <p:nvPr>
-            <p:ph sz="half" idx="2"/>
-          </p:nvPr>
-        </p:nvPicPr>
-        <p:blipFill>
-          <a:blip r:embed="rId2">
-            <a:extLst>
-              <a:ext uri="{28A0092B-C50C-407E-A947-70E740481C1C}">
-                <a14:useLocalDpi xmlns:a14="http://schemas.microsoft.com/office/drawing/2010/main" val="0"/>
-              </a:ext>
-            </a:extLst>
-          </a:blip>
-          <a:stretch>
-            <a:fillRect/>
-          </a:stretch>
-        </p:blipFill>
-        <p:spPr>
-          <a:xfrm>
-            <a:off x="-835025" y="2217208"/>
-            <a:ext cx="14112875" cy="4704291"/>
-          </a:xfrm>
-        </p:spPr>
-      </p:pic>
-      <p:sp>
-        <p:nvSpPr>
-          <p:cNvPr id="15" name="Title 14">
-            <a:extLst>
-              <a:ext uri="{FF2B5EF4-FFF2-40B4-BE49-F238E27FC236}">
-                <a16:creationId xmlns:a16="http://schemas.microsoft.com/office/drawing/2014/main" id="{7ABD325A-BFA5-4CEB-AB12-3A214E3B5C64}"/>
+      <p:sp>
+        <p:nvSpPr>
+          <p:cNvPr id="2" name="Title 1">
+            <a:extLst>
+              <a:ext uri="{FF2B5EF4-FFF2-40B4-BE49-F238E27FC236}">
+                <a16:creationId xmlns:a16="http://schemas.microsoft.com/office/drawing/2014/main" id="{70C0E02B-FFF2-43A6-87EA-1B42AF909304}"/>
               </a:ext>
             </a:extLst>
           </p:cNvPr>
@@ -3914,20 +4928,74 @@
             <p:ph type="title"/>
           </p:nvPr>
         </p:nvSpPr>
-        <p:spPr>
-          <a:xfrm>
-            <a:off x="839788" y="365125"/>
-            <a:ext cx="10515600" cy="1325563"/>
-          </a:xfrm>
-        </p:spPr>
-        <p:txBody>
-          <a:bodyPr/>
+        <p:spPr/>
+        <p:txBody>
+          <a:bodyPr>
+            <a:normAutofit fontScale="90000"/>
+          </a:bodyPr>
           <a:lstStyle/>
           <a:p>
             <a:pPr algn="ctr"/>
-            <a:r>
-              <a:rPr lang="en-US" b="1" dirty="0"/>
-              <a:t>Compare of movies, by rating and year</a:t>
+            <a:br>
+              <a:rPr lang="en-US" dirty="0"/>
+            </a:br>
+            <a:br>
+              <a:rPr lang="en-US" dirty="0"/>
+            </a:br>
+            <a:br>
+              <a:rPr lang="en-US" dirty="0"/>
+            </a:br>
+            <a:br>
+              <a:rPr lang="en-US" dirty="0"/>
+            </a:br>
+            <a:br>
+              <a:rPr lang="en-US" dirty="0"/>
+            </a:br>
+            <a:br>
+              <a:rPr lang="en-US" dirty="0"/>
+            </a:br>
+            <a:br>
+              <a:rPr lang="en-US" dirty="0"/>
+            </a:br>
+            <a:br>
+              <a:rPr lang="en-US" dirty="0"/>
+            </a:br>
+            <a:br>
+              <a:rPr lang="en-US" dirty="0"/>
+            </a:br>
+            <a:br>
+              <a:rPr lang="en-US" dirty="0"/>
+            </a:br>
+            <a:r>
+              <a:rPr lang="en-US" dirty="0">
+                <a:latin typeface="Arial Black" panose="020B0A04020102020204" pitchFamily="34" charset="0"/>
+              </a:rPr>
+              <a:t>ACT 1:</a:t>
+            </a:r>
+            <a:br>
+              <a:rPr lang="en-US" dirty="0">
+                <a:latin typeface="Arial Black" panose="020B0A04020102020204" pitchFamily="34" charset="0"/>
+              </a:rPr>
+            </a:br>
+            <a:br>
+              <a:rPr lang="en-US" dirty="0"/>
+            </a:br>
+            <a:r>
+              <a:rPr lang="en-US" sz="6100" b="1" dirty="0">
+                <a:latin typeface="Arial Black" panose="020B0A04020102020204" pitchFamily="34" charset="0"/>
+              </a:rPr>
+              <a:t>Movie Rating</a:t>
+            </a:r>
+            <a:br>
+              <a:rPr lang="en-US" sz="6100" b="1" dirty="0">
+                <a:latin typeface="Arial Black" panose="020B0A04020102020204" pitchFamily="34" charset="0"/>
+              </a:rPr>
+            </a:br>
+            <a:r>
+              <a:rPr lang="en-US" sz="6100" b="1" dirty="0">
+                <a:latin typeface="Arial Black" panose="020B0A04020102020204" pitchFamily="34" charset="0"/>
+              </a:rPr>
+              <a:t>Analysis</a:t>
             </a:r>
           </a:p>
         </p:txBody>
@@ -3935,7 +5003,7 @@
     </p:spTree>
     <p:extLst>
       <p:ext uri="{BB962C8B-B14F-4D97-AF65-F5344CB8AC3E}">
-        <p14:creationId xmlns:p14="http://schemas.microsoft.com/office/powerpoint/2010/main" val="3412254660"/>
+        <p14:creationId xmlns:p14="http://schemas.microsoft.com/office/powerpoint/2010/main" val="2359355291"/>
       </p:ext>
     </p:extLst>
   </p:cSld>
@@ -3962,6 +5030,105 @@
           <a:chExt cx="0" cy="0"/>
         </a:xfrm>
       </p:grpSpPr>
+      <p:pic>
+        <p:nvPicPr>
+          <p:cNvPr id="8" name="Content Placeholder 7" descr="A close up of a map&#10;&#10;Description automatically generated">
+            <a:extLst>
+              <a:ext uri="{FF2B5EF4-FFF2-40B4-BE49-F238E27FC236}">
+                <a16:creationId xmlns:a16="http://schemas.microsoft.com/office/drawing/2014/main" id="{0B7BE1D6-1C78-453D-8956-83F80D267369}"/>
+              </a:ext>
+            </a:extLst>
+          </p:cNvPr>
+          <p:cNvPicPr>
+            <a:picLocks noGrp="1" noChangeAspect="1"/>
+          </p:cNvPicPr>
+          <p:nvPr>
+            <p:ph sz="half" idx="2"/>
+          </p:nvPr>
+        </p:nvPicPr>
+        <p:blipFill>
+          <a:blip r:embed="rId2">
+            <a:extLst>
+              <a:ext uri="{28A0092B-C50C-407E-A947-70E740481C1C}">
+                <a14:useLocalDpi xmlns:a14="http://schemas.microsoft.com/office/drawing/2010/main" val="0"/>
+              </a:ext>
+            </a:extLst>
+          </a:blip>
+          <a:stretch>
+            <a:fillRect/>
+          </a:stretch>
+        </p:blipFill>
+        <p:spPr>
+          <a:xfrm>
+            <a:off x="-835025" y="2217208"/>
+            <a:ext cx="14112875" cy="4704291"/>
+          </a:xfrm>
+        </p:spPr>
+      </p:pic>
+      <p:sp>
+        <p:nvSpPr>
+          <p:cNvPr id="15" name="Title 14">
+            <a:extLst>
+              <a:ext uri="{FF2B5EF4-FFF2-40B4-BE49-F238E27FC236}">
+                <a16:creationId xmlns:a16="http://schemas.microsoft.com/office/drawing/2014/main" id="{7ABD325A-BFA5-4CEB-AB12-3A214E3B5C64}"/>
+              </a:ext>
+            </a:extLst>
+          </p:cNvPr>
+          <p:cNvSpPr>
+            <a:spLocks noGrp="1"/>
+          </p:cNvSpPr>
+          <p:nvPr>
+            <p:ph type="title"/>
+          </p:nvPr>
+        </p:nvSpPr>
+        <p:spPr>
+          <a:xfrm>
+            <a:off x="839788" y="365125"/>
+            <a:ext cx="10515600" cy="1325563"/>
+          </a:xfrm>
+        </p:spPr>
+        <p:txBody>
+          <a:bodyPr/>
+          <a:lstStyle/>
+          <a:p>
+            <a:pPr algn="ctr"/>
+            <a:r>
+              <a:rPr lang="en-US" b="1" dirty="0"/>
+              <a:t>Compare of movies, by rating and year</a:t>
+            </a:r>
+          </a:p>
+        </p:txBody>
+      </p:sp>
+    </p:spTree>
+    <p:extLst>
+      <p:ext uri="{BB962C8B-B14F-4D97-AF65-F5344CB8AC3E}">
+        <p14:creationId xmlns:p14="http://schemas.microsoft.com/office/powerpoint/2010/main" val="3412254660"/>
+      </p:ext>
+    </p:extLst>
+  </p:cSld>
+  <p:clrMapOvr>
+    <a:masterClrMapping/>
+  </p:clrMapOvr>
+</p:sld>
+</file>
+
+<file path=ppt/slides/slide7.xml><?xml version="1.0" encoding="utf-8"?>
+<p:sld xmlns:a="http://schemas.openxmlformats.org/drawingml/2006/main" xmlns:r="http://schemas.openxmlformats.org/officeDocument/2006/relationships" xmlns:p="http://schemas.openxmlformats.org/presentationml/2006/main">
+  <p:cSld>
+    <p:spTree>
+      <p:nvGrpSpPr>
+        <p:cNvPr id="1" name=""/>
+        <p:cNvGrpSpPr/>
+        <p:nvPr/>
+      </p:nvGrpSpPr>
+      <p:grpSpPr>
+        <a:xfrm>
+          <a:off x="0" y="0"/>
+          <a:ext cx="0" cy="0"/>
+          <a:chOff x="0" y="0"/>
+          <a:chExt cx="0" cy="0"/>
+        </a:xfrm>
+      </p:grpSpPr>
       <p:sp>
         <p:nvSpPr>
           <p:cNvPr id="15" name="Title 14">
@@ -4035,139 +5202,6 @@
     <p:extLst>
       <p:ext uri="{BB962C8B-B14F-4D97-AF65-F5344CB8AC3E}">
         <p14:creationId xmlns:p14="http://schemas.microsoft.com/office/powerpoint/2010/main" val="3603200401"/>
-      </p:ext>
-    </p:extLst>
-  </p:cSld>
-  <p:clrMapOvr>
-    <a:masterClrMapping/>
-  </p:clrMapOvr>
-</p:sld>
-</file>
-
-<file path=ppt/slides/slide7.xml><?xml version="1.0" encoding="utf-8"?>
-<p:sld xmlns:a="http://schemas.openxmlformats.org/drawingml/2006/main" xmlns:r="http://schemas.openxmlformats.org/officeDocument/2006/relationships" xmlns:p="http://schemas.openxmlformats.org/presentationml/2006/main">
-  <p:cSld>
-    <p:bg>
-      <p:bgPr>
-        <a:blipFill dpi="0" rotWithShape="1">
-          <a:blip r:embed="rId2">
-            <a:lum/>
-          </a:blip>
-          <a:srcRect/>
-          <a:stretch>
-            <a:fillRect t="-7000" b="-7000"/>
-          </a:stretch>
-        </a:blipFill>
-        <a:effectLst/>
-      </p:bgPr>
-    </p:bg>
-    <p:spTree>
-      <p:nvGrpSpPr>
-        <p:cNvPr id="1" name=""/>
-        <p:cNvGrpSpPr/>
-        <p:nvPr/>
-      </p:nvGrpSpPr>
-      <p:grpSpPr>
-        <a:xfrm>
-          <a:off x="0" y="0"/>
-          <a:ext cx="0" cy="0"/>
-          <a:chOff x="0" y="0"/>
-          <a:chExt cx="0" cy="0"/>
-        </a:xfrm>
-      </p:grpSpPr>
-      <p:sp>
-        <p:nvSpPr>
-          <p:cNvPr id="2" name="Title 1">
-            <a:extLst>
-              <a:ext uri="{FF2B5EF4-FFF2-40B4-BE49-F238E27FC236}">
-                <a16:creationId xmlns:a16="http://schemas.microsoft.com/office/drawing/2014/main" id="{3ABF84FD-79A1-4C52-859E-E3B9FD0D6B0A}"/>
-              </a:ext>
-            </a:extLst>
-          </p:cNvPr>
-          <p:cNvSpPr>
-            <a:spLocks noGrp="1"/>
-          </p:cNvSpPr>
-          <p:nvPr>
-            <p:ph type="title"/>
-          </p:nvPr>
-        </p:nvSpPr>
-        <p:spPr/>
-        <p:txBody>
-          <a:bodyPr/>
-          <a:lstStyle/>
-          <a:p>
-            <a:pPr algn="ctr"/>
-            <a:br>
-              <a:rPr lang="en-US" b="1" dirty="0"/>
-            </a:br>
-            <a:r>
-              <a:rPr lang="en-US" b="1" dirty="0"/>
-              <a:t>Analysis of ROI by Rating</a:t>
-            </a:r>
-          </a:p>
-        </p:txBody>
-      </p:sp>
-      <p:sp>
-        <p:nvSpPr>
-          <p:cNvPr id="3" name="Content Placeholder 2">
-            <a:extLst>
-              <a:ext uri="{FF2B5EF4-FFF2-40B4-BE49-F238E27FC236}">
-                <a16:creationId xmlns:a16="http://schemas.microsoft.com/office/drawing/2014/main" id="{087D914D-4279-445E-824B-836F7C22BBF7}"/>
-              </a:ext>
-            </a:extLst>
-          </p:cNvPr>
-          <p:cNvSpPr>
-            <a:spLocks noGrp="1"/>
-          </p:cNvSpPr>
-          <p:nvPr>
-            <p:ph idx="1"/>
-          </p:nvPr>
-        </p:nvSpPr>
-        <p:spPr>
-          <a:noFill/>
-        </p:spPr>
-        <p:txBody>
-          <a:bodyPr/>
-          <a:lstStyle/>
-          <a:p>
-            <a:r>
-              <a:rPr lang="en-US" dirty="0"/>
-              <a:t>More PG-13 and R rated movies created</a:t>
-            </a:r>
-          </a:p>
-          <a:p>
-            <a:r>
-              <a:rPr lang="en-US" dirty="0"/>
-              <a:t>ROI fluctuates highly depending on year</a:t>
-            </a:r>
-          </a:p>
-          <a:p>
-            <a:r>
-              <a:rPr lang="en-US" dirty="0"/>
-              <a:t>PG and R rated movies have better return on investment overall</a:t>
-            </a:r>
-          </a:p>
-          <a:p>
-            <a:endParaRPr lang="en-US" dirty="0"/>
-          </a:p>
-          <a:p>
-            <a:pPr marL="0" indent="0" algn="ctr">
-              <a:buNone/>
-            </a:pPr>
-            <a:r>
-              <a:rPr lang="en-US" sz="3200" dirty="0"/>
-              <a:t>Based on Ratings alone the number of R rated moves and the average ROI is much high and indicates R rated movies are the best investment</a:t>
-            </a:r>
-          </a:p>
-          <a:p>
-            <a:endParaRPr lang="en-US" dirty="0"/>
-          </a:p>
-        </p:txBody>
-      </p:sp>
-    </p:spTree>
-    <p:extLst>
-      <p:ext uri="{BB962C8B-B14F-4D97-AF65-F5344CB8AC3E}">
-        <p14:creationId xmlns:p14="http://schemas.microsoft.com/office/powerpoint/2010/main" val="930147941"/>
       </p:ext>
     </p:extLst>
   </p:cSld>
@@ -4213,7 +5247,7 @@
           <p:cNvPr id="2" name="Title 1">
             <a:extLst>
               <a:ext uri="{FF2B5EF4-FFF2-40B4-BE49-F238E27FC236}">
-                <a16:creationId xmlns:a16="http://schemas.microsoft.com/office/drawing/2014/main" id="{560864A3-98A1-4552-8A4F-02D846262E9C}"/>
+                <a16:creationId xmlns:a16="http://schemas.microsoft.com/office/drawing/2014/main" id="{3ABF84FD-79A1-4C52-859E-E3B9FD0D6B0A}"/>
               </a:ext>
             </a:extLst>
           </p:cNvPr>
@@ -4235,7 +5269,7 @@
             </a:br>
             <a:r>
               <a:rPr lang="en-US" b="1" dirty="0"/>
-              <a:t>The over all Recommendation</a:t>
+              <a:t>Findings</a:t>
             </a:r>
           </a:p>
         </p:txBody>
@@ -4245,7 +5279,7 @@
           <p:cNvPr id="3" name="Content Placeholder 2">
             <a:extLst>
               <a:ext uri="{FF2B5EF4-FFF2-40B4-BE49-F238E27FC236}">
-                <a16:creationId xmlns:a16="http://schemas.microsoft.com/office/drawing/2014/main" id="{854828F9-E88B-487D-972A-58EA7768DD62}"/>
+                <a16:creationId xmlns:a16="http://schemas.microsoft.com/office/drawing/2014/main" id="{087D914D-4279-445E-824B-836F7C22BBF7}"/>
               </a:ext>
             </a:extLst>
           </p:cNvPr>
@@ -4256,34 +5290,51 @@
             <p:ph idx="1"/>
           </p:nvPr>
         </p:nvSpPr>
-        <p:spPr/>
-        <p:txBody>
-          <a:bodyPr/>
-          <a:lstStyle/>
-          <a:p>
-            <a:r>
-              <a:rPr lang="en-US" dirty="0"/>
-              <a:t>Point 1</a:t>
-            </a:r>
-          </a:p>
-          <a:p>
-            <a:r>
-              <a:rPr lang="en-US" dirty="0"/>
-              <a:t>Point 2</a:t>
-            </a:r>
-          </a:p>
-          <a:p>
-            <a:r>
-              <a:rPr lang="en-US" dirty="0"/>
-              <a:t>Point 3</a:t>
-            </a:r>
+        <p:spPr>
+          <a:noFill/>
+        </p:spPr>
+        <p:txBody>
+          <a:bodyPr/>
+          <a:lstStyle/>
+          <a:p>
+            <a:r>
+              <a:rPr lang="en-US" dirty="0"/>
+              <a:t>More PG-13 and R rated movies created</a:t>
+            </a:r>
+          </a:p>
+          <a:p>
+            <a:r>
+              <a:rPr lang="en-US" dirty="0"/>
+              <a:t>ROI fluctuates highly depending on year</a:t>
+            </a:r>
+          </a:p>
+          <a:p>
+            <a:r>
+              <a:rPr lang="en-US" dirty="0"/>
+              <a:t>PG and R rated movies have better return on investment overall</a:t>
+            </a:r>
+          </a:p>
+          <a:p>
+            <a:endParaRPr lang="en-US" dirty="0"/>
+          </a:p>
+          <a:p>
+            <a:pPr marL="0" indent="0" algn="ctr">
+              <a:buNone/>
+            </a:pPr>
+            <a:r>
+              <a:rPr lang="en-US" sz="3200" dirty="0"/>
+              <a:t>Based on Ratings alone the number of R rated moves and the average ROI is much high and indicates R rated movies are the best investment</a:t>
+            </a:r>
+          </a:p>
+          <a:p>
+            <a:endParaRPr lang="en-US" dirty="0"/>
           </a:p>
         </p:txBody>
       </p:sp>
     </p:spTree>
     <p:extLst>
       <p:ext uri="{BB962C8B-B14F-4D97-AF65-F5344CB8AC3E}">
-        <p14:creationId xmlns:p14="http://schemas.microsoft.com/office/powerpoint/2010/main" val="217226028"/>
+        <p14:creationId xmlns:p14="http://schemas.microsoft.com/office/powerpoint/2010/main" val="930147941"/>
       </p:ext>
     </p:extLst>
   </p:cSld>
@@ -4304,7 +5355,7 @@
           </a:blip>
           <a:srcRect/>
           <a:stretch>
-            <a:fillRect t="-17000" b="-17000"/>
+            <a:fillRect t="-18000" b="-18000"/>
           </a:stretch>
         </a:blipFill>
         <a:effectLst/>
@@ -4329,7 +5380,7 @@
           <p:cNvPr id="2" name="Title 1">
             <a:extLst>
               <a:ext uri="{FF2B5EF4-FFF2-40B4-BE49-F238E27FC236}">
-                <a16:creationId xmlns:a16="http://schemas.microsoft.com/office/drawing/2014/main" id="{B25748F9-2367-47F9-961C-B8F5427D5420}"/>
+                <a16:creationId xmlns:a16="http://schemas.microsoft.com/office/drawing/2014/main" id="{70C0E02B-FFF2-43A6-87EA-1B42AF909304}"/>
               </a:ext>
             </a:extLst>
           </p:cNvPr>
@@ -4342,67 +5393,83 @@
         </p:nvSpPr>
         <p:spPr/>
         <p:txBody>
-          <a:bodyPr/>
-          <a:lstStyle/>
-          <a:p>
-            <a:r>
-              <a:rPr lang="en-US" dirty="0"/>
-              <a:t> </a:t>
-            </a:r>
-          </a:p>
-        </p:txBody>
-      </p:sp>
-      <p:sp>
-        <p:nvSpPr>
-          <p:cNvPr id="3" name="Content Placeholder 2">
-            <a:extLst>
-              <a:ext uri="{FF2B5EF4-FFF2-40B4-BE49-F238E27FC236}">
-                <a16:creationId xmlns:a16="http://schemas.microsoft.com/office/drawing/2014/main" id="{A25AC3A2-B41F-4905-99C5-D0F77D215056}"/>
-              </a:ext>
-            </a:extLst>
-          </p:cNvPr>
-          <p:cNvSpPr>
-            <a:spLocks noGrp="1"/>
-          </p:cNvSpPr>
-          <p:nvPr>
-            <p:ph idx="1"/>
-          </p:nvPr>
-        </p:nvSpPr>
-        <p:spPr/>
-        <p:txBody>
-          <a:bodyPr/>
-          <a:lstStyle/>
-          <a:p>
-            <a:r>
-              <a:rPr lang="en-US" dirty="0"/>
-              <a:t>     </a:t>
-            </a:r>
-          </a:p>
-          <a:p>
-            <a:endParaRPr lang="en-US" dirty="0"/>
-          </a:p>
-          <a:p>
-            <a:endParaRPr lang="en-US" dirty="0"/>
-          </a:p>
-          <a:p>
-            <a:pPr marL="0" indent="0" algn="ctr">
-              <a:buNone/>
-            </a:pPr>
-            <a:r>
-              <a:rPr lang="en-US" sz="9600" b="1" dirty="0">
-                <a:solidFill>
-                  <a:schemeClr val="bg1"/>
-                </a:solidFill>
+          <a:bodyPr>
+            <a:normAutofit fontScale="90000"/>
+          </a:bodyPr>
+          <a:lstStyle/>
+          <a:p>
+            <a:pPr algn="ctr"/>
+            <a:br>
+              <a:rPr lang="en-US" dirty="0"/>
+            </a:br>
+            <a:br>
+              <a:rPr lang="en-US" dirty="0"/>
+            </a:br>
+            <a:br>
+              <a:rPr lang="en-US" dirty="0"/>
+            </a:br>
+            <a:br>
+              <a:rPr lang="en-US" dirty="0"/>
+            </a:br>
+            <a:br>
+              <a:rPr lang="en-US" dirty="0"/>
+            </a:br>
+            <a:br>
+              <a:rPr lang="en-US" dirty="0"/>
+            </a:br>
+            <a:br>
+              <a:rPr lang="en-US" dirty="0"/>
+            </a:br>
+            <a:br>
+              <a:rPr lang="en-US" dirty="0"/>
+            </a:br>
+            <a:br>
+              <a:rPr lang="en-US" dirty="0"/>
+            </a:br>
+            <a:r>
+              <a:rPr lang="en-US" dirty="0">
+                <a:latin typeface="Arial Black" panose="020B0A04020102020204" pitchFamily="34" charset="0"/>
               </a:rPr>
-              <a:t>Q &amp; A</a:t>
-            </a:r>
+              <a:t>ACT 2:</a:t>
+            </a:r>
+            <a:br>
+              <a:rPr lang="en-US" dirty="0">
+                <a:latin typeface="Arial Black" panose="020B0A04020102020204" pitchFamily="34" charset="0"/>
+              </a:rPr>
+            </a:br>
+            <a:br>
+              <a:rPr lang="en-US" dirty="0"/>
+            </a:br>
+            <a:r>
+              <a:rPr lang="en-US" sz="6100" b="1" dirty="0">
+                <a:latin typeface="Arial Black" panose="020B0A04020102020204" pitchFamily="34" charset="0"/>
+              </a:rPr>
+              <a:t>Genre</a:t>
+            </a:r>
+            <a:br>
+              <a:rPr lang="en-US" sz="6100" b="1" dirty="0">
+                <a:latin typeface="Arial Black" panose="020B0A04020102020204" pitchFamily="34" charset="0"/>
+              </a:rPr>
+            </a:br>
+            <a:r>
+              <a:rPr lang="en-US" sz="6100" b="1" dirty="0">
+                <a:latin typeface="Arial Black" panose="020B0A04020102020204" pitchFamily="34" charset="0"/>
+              </a:rPr>
+              <a:t>Analysis</a:t>
+            </a:r>
+            <a:endParaRPr lang="en-US" sz="6100" b="1" dirty="0">
+              <a:solidFill>
+                <a:schemeClr val="bg1"/>
+              </a:solidFill>
+              <a:latin typeface="Arial Black" panose="020B0A04020102020204" pitchFamily="34" charset="0"/>
+            </a:endParaRPr>
           </a:p>
         </p:txBody>
       </p:sp>
     </p:spTree>
     <p:extLst>
       <p:ext uri="{BB962C8B-B14F-4D97-AF65-F5344CB8AC3E}">
-        <p14:creationId xmlns:p14="http://schemas.microsoft.com/office/powerpoint/2010/main" val="3698691496"/>
+        <p14:creationId xmlns:p14="http://schemas.microsoft.com/office/powerpoint/2010/main" val="881722951"/>
       </p:ext>
     </p:extLst>
   </p:cSld>

</xml_diff>

<commit_message>
updated the presentation, only looked at the other notebooks
</commit_message>
<xml_diff>
--- a/Project 1 Presentation.pptx
+++ b/Project 1 Presentation.pptx
@@ -278,7 +278,7 @@
           <a:p>
             <a:fld id="{7F3A2633-CE2D-4284-AED7-B04551D23CDA}" type="datetimeFigureOut">
               <a:rPr lang="en-US" smtClean="0"/>
-              <a:t>12/3/2019</a:t>
+              <a:t>12/4/2019</a:t>
             </a:fld>
             <a:endParaRPr lang="en-US"/>
           </a:p>
@@ -476,7 +476,7 @@
           <a:p>
             <a:fld id="{7F3A2633-CE2D-4284-AED7-B04551D23CDA}" type="datetimeFigureOut">
               <a:rPr lang="en-US" smtClean="0"/>
-              <a:t>12/3/2019</a:t>
+              <a:t>12/4/2019</a:t>
             </a:fld>
             <a:endParaRPr lang="en-US"/>
           </a:p>
@@ -684,7 +684,7 @@
           <a:p>
             <a:fld id="{7F3A2633-CE2D-4284-AED7-B04551D23CDA}" type="datetimeFigureOut">
               <a:rPr lang="en-US" smtClean="0"/>
-              <a:t>12/3/2019</a:t>
+              <a:t>12/4/2019</a:t>
             </a:fld>
             <a:endParaRPr lang="en-US"/>
           </a:p>
@@ -882,7 +882,7 @@
           <a:p>
             <a:fld id="{7F3A2633-CE2D-4284-AED7-B04551D23CDA}" type="datetimeFigureOut">
               <a:rPr lang="en-US" smtClean="0"/>
-              <a:t>12/3/2019</a:t>
+              <a:t>12/4/2019</a:t>
             </a:fld>
             <a:endParaRPr lang="en-US"/>
           </a:p>
@@ -1157,7 +1157,7 @@
           <a:p>
             <a:fld id="{7F3A2633-CE2D-4284-AED7-B04551D23CDA}" type="datetimeFigureOut">
               <a:rPr lang="en-US" smtClean="0"/>
-              <a:t>12/3/2019</a:t>
+              <a:t>12/4/2019</a:t>
             </a:fld>
             <a:endParaRPr lang="en-US"/>
           </a:p>
@@ -1422,7 +1422,7 @@
           <a:p>
             <a:fld id="{7F3A2633-CE2D-4284-AED7-B04551D23CDA}" type="datetimeFigureOut">
               <a:rPr lang="en-US" smtClean="0"/>
-              <a:t>12/3/2019</a:t>
+              <a:t>12/4/2019</a:t>
             </a:fld>
             <a:endParaRPr lang="en-US"/>
           </a:p>
@@ -1834,7 +1834,7 @@
           <a:p>
             <a:fld id="{7F3A2633-CE2D-4284-AED7-B04551D23CDA}" type="datetimeFigureOut">
               <a:rPr lang="en-US" smtClean="0"/>
-              <a:t>12/3/2019</a:t>
+              <a:t>12/4/2019</a:t>
             </a:fld>
             <a:endParaRPr lang="en-US"/>
           </a:p>
@@ -1975,7 +1975,7 @@
           <a:p>
             <a:fld id="{7F3A2633-CE2D-4284-AED7-B04551D23CDA}" type="datetimeFigureOut">
               <a:rPr lang="en-US" smtClean="0"/>
-              <a:t>12/3/2019</a:t>
+              <a:t>12/4/2019</a:t>
             </a:fld>
             <a:endParaRPr lang="en-US"/>
           </a:p>
@@ -2088,7 +2088,7 @@
           <a:p>
             <a:fld id="{7F3A2633-CE2D-4284-AED7-B04551D23CDA}" type="datetimeFigureOut">
               <a:rPr lang="en-US" smtClean="0"/>
-              <a:t>12/3/2019</a:t>
+              <a:t>12/4/2019</a:t>
             </a:fld>
             <a:endParaRPr lang="en-US"/>
           </a:p>
@@ -2399,7 +2399,7 @@
           <a:p>
             <a:fld id="{7F3A2633-CE2D-4284-AED7-B04551D23CDA}" type="datetimeFigureOut">
               <a:rPr lang="en-US" smtClean="0"/>
-              <a:t>12/3/2019</a:t>
+              <a:t>12/4/2019</a:t>
             </a:fld>
             <a:endParaRPr lang="en-US"/>
           </a:p>
@@ -2687,7 +2687,7 @@
           <a:p>
             <a:fld id="{7F3A2633-CE2D-4284-AED7-B04551D23CDA}" type="datetimeFigureOut">
               <a:rPr lang="en-US" smtClean="0"/>
-              <a:t>12/3/2019</a:t>
+              <a:t>12/4/2019</a:t>
             </a:fld>
             <a:endParaRPr lang="en-US"/>
           </a:p>
@@ -2928,7 +2928,7 @@
           <a:p>
             <a:fld id="{7F3A2633-CE2D-4284-AED7-B04551D23CDA}" type="datetimeFigureOut">
               <a:rPr lang="en-US" smtClean="0"/>
-              <a:t>12/3/2019</a:t>
+              <a:t>12/4/2019</a:t>
             </a:fld>
             <a:endParaRPr lang="en-US"/>
           </a:p>
@@ -4632,19 +4632,47 @@
           <a:p>
             <a:r>
               <a:rPr lang="en-US" dirty="0"/>
-              <a:t>Point 1</a:t>
-            </a:r>
-          </a:p>
-          <a:p>
-            <a:r>
-              <a:rPr lang="en-US" dirty="0"/>
-              <a:t>Point 2</a:t>
-            </a:r>
-          </a:p>
-          <a:p>
-            <a:r>
-              <a:rPr lang="en-US" dirty="0"/>
-              <a:t>Point 3</a:t>
+              <a:t>Based on the analysis ran the best criteria to generate the best ROI for movies:</a:t>
+            </a:r>
+          </a:p>
+          <a:p>
+            <a:pPr lvl="1"/>
+            <a:r>
+              <a:rPr lang="en-US" dirty="0"/>
+              <a:t>R rated </a:t>
+            </a:r>
+          </a:p>
+          <a:p>
+            <a:pPr lvl="1"/>
+            <a:r>
+              <a:rPr lang="en-US" dirty="0"/>
+              <a:t>Horror, Mystery &amp; Suspense</a:t>
+            </a:r>
+          </a:p>
+          <a:p>
+            <a:pPr lvl="1"/>
+            <a:r>
+              <a:rPr lang="en-US" dirty="0"/>
+              <a:t>Critic Rating between ???</a:t>
+            </a:r>
+          </a:p>
+          <a:p>
+            <a:pPr lvl="1"/>
+            <a:r>
+              <a:rPr lang="en-US" dirty="0"/>
+              <a:t>Audience </a:t>
+            </a:r>
+            <a:r>
+              <a:rPr lang="en-US"/>
+              <a:t>Rating between ???</a:t>
+            </a:r>
+            <a:endParaRPr lang="en-US" dirty="0"/>
+          </a:p>
+          <a:p>
+            <a:pPr lvl="1"/>
+            <a:r>
+              <a:rPr lang="en-US" dirty="0"/>
+              <a:t>Run time close to 90 minutes</a:t>
             </a:r>
           </a:p>
         </p:txBody>
@@ -4754,21 +4782,39 @@
           <a:p>
             <a:r>
               <a:rPr lang="en-US" dirty="0"/>
-              <a:t>Data source issues, then the API’s didn’t have everything, had timing/count issues</a:t>
-            </a:r>
-          </a:p>
-          <a:p>
-            <a:r>
-              <a:rPr lang="en-US" dirty="0"/>
-              <a:t>Would like to have reviewed in more depth why the movie rating versus the ROI fluctuated year over year?</a:t>
+              <a:t>Data source issues, the API’s didn’t have everything, had timing/count issues so found the Rotten Tomatoes on Kaggle – relying on someone else’s research/accuracy</a:t>
+            </a:r>
+          </a:p>
+          <a:p>
+            <a:r>
+              <a:rPr lang="en-US" dirty="0"/>
+              <a:t>Would like to have reviewed in more depth:</a:t>
             </a:r>
           </a:p>
           <a:p>
             <a:pPr lvl="1"/>
             <a:r>
               <a:rPr lang="en-US" dirty="0"/>
+              <a:t>Why the movie rating versus the ROI fluctuated year over year?</a:t>
+            </a:r>
+          </a:p>
+          <a:p>
+            <a:pPr lvl="1"/>
+            <a:r>
+              <a:rPr lang="en-US" dirty="0"/>
               <a:t>Were there other factors influencing the ROI?</a:t>
             </a:r>
+          </a:p>
+          <a:p>
+            <a:pPr lvl="1"/>
+            <a:r>
+              <a:rPr lang="en-US" dirty="0"/>
+              <a:t>Does plot have any significance?</a:t>
+            </a:r>
+          </a:p>
+          <a:p>
+            <a:pPr lvl="1"/>
+            <a:endParaRPr lang="en-US" dirty="0"/>
           </a:p>
         </p:txBody>
       </p:sp>

</xml_diff>